<commit_message>
add advantage and disadvantage in knn
</commit_message>
<xml_diff>
--- a/ML Algorithm/Basic Algorithms/KNN/Classification/KNN/KNN.pptx
+++ b/ML Algorithm/Basic Algorithms/KNN/Classification/KNN/KNN.pptx
@@ -21,6 +21,7 @@
     <p:sldId id="269" r:id="rId15"/>
     <p:sldId id="270" r:id="rId16"/>
     <p:sldId id="271" r:id="rId17"/>
+    <p:sldId id="272" r:id="rId18"/>
   </p:sldIdLst>
   <p:sldSz cx="12192000" cy="6858000"/>
   <p:notesSz cx="6858000" cy="9144000"/>
@@ -140,6 +141,7 @@
             <p14:sldId id="269"/>
             <p14:sldId id="270"/>
             <p14:sldId id="271"/>
+            <p14:sldId id="272"/>
           </p14:sldIdLst>
         </p14:section>
       </p14:sectionLst>
@@ -298,7 +300,7 @@
           <a:p>
             <a:fld id="{C19FA522-58F7-46BF-AA3D-045D538A9541}" type="datetimeFigureOut">
               <a:rPr lang="en-US" smtClean="0"/>
-              <a:t>1/14/2023</a:t>
+              <a:t>2/3/2023</a:t>
             </a:fld>
             <a:endParaRPr lang="en-US"/>
           </a:p>
@@ -496,7 +498,7 @@
           <a:p>
             <a:fld id="{C19FA522-58F7-46BF-AA3D-045D538A9541}" type="datetimeFigureOut">
               <a:rPr lang="en-US" smtClean="0"/>
-              <a:t>1/14/2023</a:t>
+              <a:t>2/3/2023</a:t>
             </a:fld>
             <a:endParaRPr lang="en-US"/>
           </a:p>
@@ -704,7 +706,7 @@
           <a:p>
             <a:fld id="{C19FA522-58F7-46BF-AA3D-045D538A9541}" type="datetimeFigureOut">
               <a:rPr lang="en-US" smtClean="0"/>
-              <a:t>1/14/2023</a:t>
+              <a:t>2/3/2023</a:t>
             </a:fld>
             <a:endParaRPr lang="en-US"/>
           </a:p>
@@ -902,7 +904,7 @@
           <a:p>
             <a:fld id="{C19FA522-58F7-46BF-AA3D-045D538A9541}" type="datetimeFigureOut">
               <a:rPr lang="en-US" smtClean="0"/>
-              <a:t>1/14/2023</a:t>
+              <a:t>2/3/2023</a:t>
             </a:fld>
             <a:endParaRPr lang="en-US"/>
           </a:p>
@@ -1177,7 +1179,7 @@
           <a:p>
             <a:fld id="{C19FA522-58F7-46BF-AA3D-045D538A9541}" type="datetimeFigureOut">
               <a:rPr lang="en-US" smtClean="0"/>
-              <a:t>1/14/2023</a:t>
+              <a:t>2/3/2023</a:t>
             </a:fld>
             <a:endParaRPr lang="en-US"/>
           </a:p>
@@ -1442,7 +1444,7 @@
           <a:p>
             <a:fld id="{C19FA522-58F7-46BF-AA3D-045D538A9541}" type="datetimeFigureOut">
               <a:rPr lang="en-US" smtClean="0"/>
-              <a:t>1/14/2023</a:t>
+              <a:t>2/3/2023</a:t>
             </a:fld>
             <a:endParaRPr lang="en-US"/>
           </a:p>
@@ -1854,7 +1856,7 @@
           <a:p>
             <a:fld id="{C19FA522-58F7-46BF-AA3D-045D538A9541}" type="datetimeFigureOut">
               <a:rPr lang="en-US" smtClean="0"/>
-              <a:t>1/14/2023</a:t>
+              <a:t>2/3/2023</a:t>
             </a:fld>
             <a:endParaRPr lang="en-US"/>
           </a:p>
@@ -1995,7 +1997,7 @@
           <a:p>
             <a:fld id="{C19FA522-58F7-46BF-AA3D-045D538A9541}" type="datetimeFigureOut">
               <a:rPr lang="en-US" smtClean="0"/>
-              <a:t>1/14/2023</a:t>
+              <a:t>2/3/2023</a:t>
             </a:fld>
             <a:endParaRPr lang="en-US"/>
           </a:p>
@@ -2108,7 +2110,7 @@
           <a:p>
             <a:fld id="{C19FA522-58F7-46BF-AA3D-045D538A9541}" type="datetimeFigureOut">
               <a:rPr lang="en-US" smtClean="0"/>
-              <a:t>1/14/2023</a:t>
+              <a:t>2/3/2023</a:t>
             </a:fld>
             <a:endParaRPr lang="en-US"/>
           </a:p>
@@ -2419,7 +2421,7 @@
           <a:p>
             <a:fld id="{C19FA522-58F7-46BF-AA3D-045D538A9541}" type="datetimeFigureOut">
               <a:rPr lang="en-US" smtClean="0"/>
-              <a:t>1/14/2023</a:t>
+              <a:t>2/3/2023</a:t>
             </a:fld>
             <a:endParaRPr lang="en-US"/>
           </a:p>
@@ -2707,7 +2709,7 @@
           <a:p>
             <a:fld id="{C19FA522-58F7-46BF-AA3D-045D538A9541}" type="datetimeFigureOut">
               <a:rPr lang="en-US" smtClean="0"/>
-              <a:t>1/14/2023</a:t>
+              <a:t>2/3/2023</a:t>
             </a:fld>
             <a:endParaRPr lang="en-US"/>
           </a:p>
@@ -2948,7 +2950,7 @@
           <a:p>
             <a:fld id="{C19FA522-58F7-46BF-AA3D-045D538A9541}" type="datetimeFigureOut">
               <a:rPr lang="en-US" smtClean="0"/>
-              <a:t>1/14/2023</a:t>
+              <a:t>2/3/2023</a:t>
             </a:fld>
             <a:endParaRPr lang="en-US"/>
           </a:p>
@@ -4483,6 +4485,131 @@
     <p:extLst>
       <p:ext uri="{BB962C8B-B14F-4D97-AF65-F5344CB8AC3E}">
         <p14:creationId xmlns:p14="http://schemas.microsoft.com/office/powerpoint/2010/main" val="58475439"/>
+      </p:ext>
+    </p:extLst>
+  </p:cSld>
+  <p:clrMapOvr>
+    <a:masterClrMapping/>
+  </p:clrMapOvr>
+</p:sld>
+</file>
+
+<file path=ppt/slides/slide17.xml><?xml version="1.0" encoding="utf-8"?>
+<p:sld xmlns:a="http://schemas.openxmlformats.org/drawingml/2006/main" xmlns:r="http://schemas.openxmlformats.org/officeDocument/2006/relationships" xmlns:p="http://schemas.openxmlformats.org/presentationml/2006/main">
+  <p:cSld>
+    <p:spTree>
+      <p:nvGrpSpPr>
+        <p:cNvPr id="1" name=""/>
+        <p:cNvGrpSpPr/>
+        <p:nvPr/>
+      </p:nvGrpSpPr>
+      <p:grpSpPr>
+        <a:xfrm>
+          <a:off x="0" y="0"/>
+          <a:ext cx="0" cy="0"/>
+          <a:chOff x="0" y="0"/>
+          <a:chExt cx="0" cy="0"/>
+        </a:xfrm>
+      </p:grpSpPr>
+      <p:sp>
+        <p:nvSpPr>
+          <p:cNvPr id="3" name="Content Placeholder 2">
+            <a:extLst>
+              <a:ext uri="{FF2B5EF4-FFF2-40B4-BE49-F238E27FC236}">
+                <a16:creationId xmlns:a16="http://schemas.microsoft.com/office/drawing/2014/main" id="{B64CDEBA-965D-3547-A344-F333C957E623}"/>
+              </a:ext>
+            </a:extLst>
+          </p:cNvPr>
+          <p:cNvSpPr>
+            <a:spLocks noGrp="1"/>
+          </p:cNvSpPr>
+          <p:nvPr>
+            <p:ph idx="1"/>
+          </p:nvPr>
+        </p:nvSpPr>
+        <p:spPr>
+          <a:xfrm>
+            <a:off x="948369" y="1064108"/>
+            <a:ext cx="10515600" cy="4351338"/>
+          </a:xfrm>
+        </p:spPr>
+        <p:txBody>
+          <a:bodyPr>
+            <a:normAutofit fontScale="92500"/>
+          </a:bodyPr>
+          <a:lstStyle/>
+          <a:p>
+            <a:pPr marL="0" indent="0">
+              <a:buNone/>
+            </a:pPr>
+            <a:r>
+              <a:rPr lang="en-US" sz="2600" b="1" dirty="0"/>
+              <a:t>Advantages:</a:t>
+            </a:r>
+          </a:p>
+          <a:p>
+            <a:r>
+              <a:rPr lang="en-US" sz="2400" dirty="0"/>
+              <a:t>Works well with smaller datasets with less number of features.</a:t>
+            </a:r>
+          </a:p>
+          <a:p>
+            <a:r>
+              <a:rPr lang="en-US" sz="2400" dirty="0"/>
+              <a:t>Can be used for both classification and regression problems.</a:t>
+            </a:r>
+          </a:p>
+          <a:p>
+            <a:r>
+              <a:rPr lang="en-US" sz="2400" dirty="0"/>
+              <a:t>Easy to implement for multi-class classification problems.</a:t>
+            </a:r>
+          </a:p>
+          <a:p>
+            <a:r>
+              <a:rPr lang="en-US" sz="2400" dirty="0"/>
+              <a:t>Different distance criteria can be used. E.g.: Euclidean Distance, Manhattan Distance.</a:t>
+            </a:r>
+          </a:p>
+          <a:p>
+            <a:pPr marL="0" indent="0">
+              <a:buNone/>
+            </a:pPr>
+            <a:r>
+              <a:rPr lang="en-US" sz="2400" b="1" dirty="0"/>
+              <a:t>Disadvantages:</a:t>
+            </a:r>
+          </a:p>
+          <a:p>
+            <a:r>
+              <a:rPr lang="en-US" sz="2400" dirty="0"/>
+              <a:t>Choosing the optimum “k” value.</a:t>
+            </a:r>
+          </a:p>
+          <a:p>
+            <a:r>
+              <a:rPr lang="en-US" sz="2400" dirty="0"/>
+              <a:t>Less efficient with high dimensional data.</a:t>
+            </a:r>
+          </a:p>
+          <a:p>
+            <a:r>
+              <a:rPr lang="en-US" sz="2400" dirty="0"/>
+              <a:t>Doesn’t perform well on the imbalanced dataset.</a:t>
+            </a:r>
+          </a:p>
+          <a:p>
+            <a:r>
+              <a:rPr lang="en-US" sz="2400" dirty="0"/>
+              <a:t>Sensitive to Outliers.</a:t>
+            </a:r>
+          </a:p>
+        </p:txBody>
+      </p:sp>
+    </p:spTree>
+    <p:extLst>
+      <p:ext uri="{BB962C8B-B14F-4D97-AF65-F5344CB8AC3E}">
+        <p14:creationId xmlns:p14="http://schemas.microsoft.com/office/powerpoint/2010/main" val="1196206337"/>
       </p:ext>
     </p:extLst>
   </p:cSld>

</xml_diff>